<commit_message>
Updates to UI from Will
</commit_message>
<xml_diff>
--- a/UI pages/UI_Design_Search_aSearch_mSearch_Results.pptx
+++ b/UI pages/UI_Design_Search_aSearch_mSearch_Results.pptx
@@ -10,6 +10,7 @@
     <p:sldId id="258" r:id="rId4"/>
     <p:sldId id="260" r:id="rId5"/>
     <p:sldId id="259" r:id="rId6"/>
+    <p:sldId id="261" r:id="rId7"/>
   </p:sldIdLst>
   <p:sldSz cx="12192000" cy="6858000"/>
   <p:notesSz cx="6858000" cy="9144000"/>
@@ -118,6 +119,7 @@
             <p14:sldId id="258"/>
             <p14:sldId id="260"/>
             <p14:sldId id="259"/>
+            <p14:sldId id="261"/>
           </p14:sldIdLst>
         </p14:section>
       </p14:sectionLst>
@@ -276,7 +278,7 @@
           <a:p>
             <a:fld id="{B07D98E4-C581-4837-A4DC-3863C6035043}" type="datetimeFigureOut">
               <a:rPr lang="en-US" smtClean="0"/>
-              <a:t>10/30/2020</a:t>
+              <a:t>10/31/2020</a:t>
             </a:fld>
             <a:endParaRPr lang="en-US"/>
           </a:p>
@@ -474,7 +476,7 @@
           <a:p>
             <a:fld id="{B07D98E4-C581-4837-A4DC-3863C6035043}" type="datetimeFigureOut">
               <a:rPr lang="en-US" smtClean="0"/>
-              <a:t>10/30/2020</a:t>
+              <a:t>10/31/2020</a:t>
             </a:fld>
             <a:endParaRPr lang="en-US"/>
           </a:p>
@@ -682,7 +684,7 @@
           <a:p>
             <a:fld id="{B07D98E4-C581-4837-A4DC-3863C6035043}" type="datetimeFigureOut">
               <a:rPr lang="en-US" smtClean="0"/>
-              <a:t>10/30/2020</a:t>
+              <a:t>10/31/2020</a:t>
             </a:fld>
             <a:endParaRPr lang="en-US"/>
           </a:p>
@@ -880,7 +882,7 @@
           <a:p>
             <a:fld id="{B07D98E4-C581-4837-A4DC-3863C6035043}" type="datetimeFigureOut">
               <a:rPr lang="en-US" smtClean="0"/>
-              <a:t>10/30/2020</a:t>
+              <a:t>10/31/2020</a:t>
             </a:fld>
             <a:endParaRPr lang="en-US"/>
           </a:p>
@@ -1155,7 +1157,7 @@
           <a:p>
             <a:fld id="{B07D98E4-C581-4837-A4DC-3863C6035043}" type="datetimeFigureOut">
               <a:rPr lang="en-US" smtClean="0"/>
-              <a:t>10/30/2020</a:t>
+              <a:t>10/31/2020</a:t>
             </a:fld>
             <a:endParaRPr lang="en-US"/>
           </a:p>
@@ -1420,7 +1422,7 @@
           <a:p>
             <a:fld id="{B07D98E4-C581-4837-A4DC-3863C6035043}" type="datetimeFigureOut">
               <a:rPr lang="en-US" smtClean="0"/>
-              <a:t>10/30/2020</a:t>
+              <a:t>10/31/2020</a:t>
             </a:fld>
             <a:endParaRPr lang="en-US"/>
           </a:p>
@@ -1832,7 +1834,7 @@
           <a:p>
             <a:fld id="{B07D98E4-C581-4837-A4DC-3863C6035043}" type="datetimeFigureOut">
               <a:rPr lang="en-US" smtClean="0"/>
-              <a:t>10/30/2020</a:t>
+              <a:t>10/31/2020</a:t>
             </a:fld>
             <a:endParaRPr lang="en-US"/>
           </a:p>
@@ -1973,7 +1975,7 @@
           <a:p>
             <a:fld id="{B07D98E4-C581-4837-A4DC-3863C6035043}" type="datetimeFigureOut">
               <a:rPr lang="en-US" smtClean="0"/>
-              <a:t>10/30/2020</a:t>
+              <a:t>10/31/2020</a:t>
             </a:fld>
             <a:endParaRPr lang="en-US"/>
           </a:p>
@@ -2086,7 +2088,7 @@
           <a:p>
             <a:fld id="{B07D98E4-C581-4837-A4DC-3863C6035043}" type="datetimeFigureOut">
               <a:rPr lang="en-US" smtClean="0"/>
-              <a:t>10/30/2020</a:t>
+              <a:t>10/31/2020</a:t>
             </a:fld>
             <a:endParaRPr lang="en-US"/>
           </a:p>
@@ -2397,7 +2399,7 @@
           <a:p>
             <a:fld id="{B07D98E4-C581-4837-A4DC-3863C6035043}" type="datetimeFigureOut">
               <a:rPr lang="en-US" smtClean="0"/>
-              <a:t>10/30/2020</a:t>
+              <a:t>10/31/2020</a:t>
             </a:fld>
             <a:endParaRPr lang="en-US"/>
           </a:p>
@@ -2685,7 +2687,7 @@
           <a:p>
             <a:fld id="{B07D98E4-C581-4837-A4DC-3863C6035043}" type="datetimeFigureOut">
               <a:rPr lang="en-US" smtClean="0"/>
-              <a:t>10/30/2020</a:t>
+              <a:t>10/31/2020</a:t>
             </a:fld>
             <a:endParaRPr lang="en-US"/>
           </a:p>
@@ -2926,7 +2928,7 @@
           <a:p>
             <a:fld id="{B07D98E4-C581-4837-A4DC-3863C6035043}" type="datetimeFigureOut">
               <a:rPr lang="en-US" smtClean="0"/>
-              <a:t>10/30/2020</a:t>
+              <a:t>10/31/2020</a:t>
             </a:fld>
             <a:endParaRPr lang="en-US"/>
           </a:p>
@@ -9589,6 +9591,1398 @@
 </p:sld>
 </file>
 
+<file path=ppt/slides/slide6.xml><?xml version="1.0" encoding="utf-8"?>
+<p:sld xmlns:a="http://schemas.openxmlformats.org/drawingml/2006/main" xmlns:r="http://schemas.openxmlformats.org/officeDocument/2006/relationships" xmlns:p="http://schemas.openxmlformats.org/presentationml/2006/main">
+  <p:cSld>
+    <p:spTree>
+      <p:nvGrpSpPr>
+        <p:cNvPr id="1" name=""/>
+        <p:cNvGrpSpPr/>
+        <p:nvPr/>
+      </p:nvGrpSpPr>
+      <p:grpSpPr>
+        <a:xfrm>
+          <a:off x="0" y="0"/>
+          <a:ext cx="0" cy="0"/>
+          <a:chOff x="0" y="0"/>
+          <a:chExt cx="0" cy="0"/>
+        </a:xfrm>
+      </p:grpSpPr>
+      <p:sp>
+        <p:nvSpPr>
+          <p:cNvPr id="4" name="Rectangle: Rounded Corners 3">
+            <a:extLst>
+              <a:ext uri="{FF2B5EF4-FFF2-40B4-BE49-F238E27FC236}">
+                <a16:creationId xmlns:a16="http://schemas.microsoft.com/office/drawing/2014/main" id="{81D10FF7-4AD5-4A51-B854-4FFC323FC6D4}"/>
+              </a:ext>
+            </a:extLst>
+          </p:cNvPr>
+          <p:cNvSpPr/>
+          <p:nvPr/>
+        </p:nvSpPr>
+        <p:spPr>
+          <a:xfrm>
+            <a:off x="71252" y="605119"/>
+            <a:ext cx="2017059" cy="1093052"/>
+          </a:xfrm>
+          <a:prstGeom prst="roundRect">
+            <a:avLst/>
+          </a:prstGeom>
+        </p:spPr>
+        <p:style>
+          <a:lnRef idx="2">
+            <a:schemeClr val="accent1">
+              <a:shade val="50000"/>
+            </a:schemeClr>
+          </a:lnRef>
+          <a:fillRef idx="1">
+            <a:schemeClr val="accent1"/>
+          </a:fillRef>
+          <a:effectRef idx="0">
+            <a:schemeClr val="accent1"/>
+          </a:effectRef>
+          <a:fontRef idx="minor">
+            <a:schemeClr val="lt1"/>
+          </a:fontRef>
+        </p:style>
+        <p:txBody>
+          <a:bodyPr rtlCol="0" anchor="ctr"/>
+          <a:lstStyle/>
+          <a:p>
+            <a:pPr marL="0" marR="0" lvl="0" indent="0" algn="l" defTabSz="914400" rtl="0" eaLnBrk="1" fontAlgn="auto" latinLnBrk="0" hangingPunct="1">
+              <a:lnSpc>
+                <a:spcPct val="100000"/>
+              </a:lnSpc>
+              <a:spcBef>
+                <a:spcPts val="0"/>
+              </a:spcBef>
+              <a:spcAft>
+                <a:spcPts val="0"/>
+              </a:spcAft>
+              <a:buClrTx/>
+              <a:buSzTx/>
+              <a:buFontTx/>
+              <a:buNone/>
+              <a:tabLst/>
+              <a:defRPr/>
+            </a:pPr>
+            <a:r>
+              <a:rPr kumimoji="0" lang="en-US" sz="1800" b="0" i="0" u="none" strike="noStrike" kern="1200" cap="none" spc="0" normalizeH="0" baseline="0" noProof="0" dirty="0">
+                <a:ln>
+                  <a:noFill/>
+                </a:ln>
+                <a:solidFill>
+                  <a:prstClr val="white"/>
+                </a:solidFill>
+                <a:effectLst/>
+                <a:uLnTx/>
+                <a:uFillTx/>
+                <a:latin typeface="Calibri" panose="020F0502020204030204"/>
+                <a:ea typeface="+mn-ea"/>
+                <a:cs typeface="+mn-cs"/>
+              </a:rPr>
+              <a:t>Search</a:t>
+            </a:r>
+          </a:p>
+          <a:p>
+            <a:pPr marL="0" marR="0" lvl="0" indent="0" algn="l" defTabSz="914400" rtl="0" eaLnBrk="1" fontAlgn="auto" latinLnBrk="0" hangingPunct="1">
+              <a:lnSpc>
+                <a:spcPct val="100000"/>
+              </a:lnSpc>
+              <a:spcBef>
+                <a:spcPts val="0"/>
+              </a:spcBef>
+              <a:spcAft>
+                <a:spcPts val="0"/>
+              </a:spcAft>
+              <a:buClrTx/>
+              <a:buSzTx/>
+              <a:buFontTx/>
+              <a:buNone/>
+              <a:tabLst/>
+              <a:defRPr/>
+            </a:pPr>
+            <a:r>
+              <a:rPr kumimoji="0" lang="en-US" sz="1400" b="0" i="0" u="none" strike="noStrike" kern="1200" cap="none" spc="0" normalizeH="0" baseline="0" noProof="0" dirty="0">
+                <a:ln>
+                  <a:noFill/>
+                </a:ln>
+                <a:solidFill>
+                  <a:prstClr val="white"/>
+                </a:solidFill>
+                <a:effectLst/>
+                <a:uLnTx/>
+                <a:uFillTx/>
+                <a:latin typeface="Calibri" panose="020F0502020204030204"/>
+                <a:ea typeface="+mn-ea"/>
+                <a:cs typeface="+mn-cs"/>
+              </a:rPr>
+              <a:t>     Advanced Search</a:t>
+            </a:r>
+          </a:p>
+          <a:p>
+            <a:pPr marL="0" marR="0" lvl="0" indent="0" algn="l" defTabSz="914400" rtl="0" eaLnBrk="1" fontAlgn="auto" latinLnBrk="0" hangingPunct="1">
+              <a:lnSpc>
+                <a:spcPct val="100000"/>
+              </a:lnSpc>
+              <a:spcBef>
+                <a:spcPts val="0"/>
+              </a:spcBef>
+              <a:spcAft>
+                <a:spcPts val="0"/>
+              </a:spcAft>
+              <a:buClrTx/>
+              <a:buSzTx/>
+              <a:buFontTx/>
+              <a:buNone/>
+              <a:tabLst/>
+              <a:defRPr/>
+            </a:pPr>
+            <a:r>
+              <a:rPr kumimoji="0" lang="en-US" sz="1800" b="0" i="0" u="none" strike="noStrike" kern="1200" cap="none" spc="0" normalizeH="0" baseline="0" noProof="0" dirty="0">
+                <a:ln>
+                  <a:noFill/>
+                </a:ln>
+                <a:solidFill>
+                  <a:prstClr val="white"/>
+                </a:solidFill>
+                <a:effectLst/>
+                <a:uLnTx/>
+                <a:uFillTx/>
+                <a:latin typeface="Calibri" panose="020F0502020204030204"/>
+                <a:ea typeface="+mn-ea"/>
+                <a:cs typeface="+mn-cs"/>
+              </a:rPr>
+              <a:t>Register Expert</a:t>
+            </a:r>
+          </a:p>
+        </p:txBody>
+      </p:sp>
+      <p:sp>
+        <p:nvSpPr>
+          <p:cNvPr id="5" name="Rectangle: Rounded Corners 4">
+            <a:extLst>
+              <a:ext uri="{FF2B5EF4-FFF2-40B4-BE49-F238E27FC236}">
+                <a16:creationId xmlns:a16="http://schemas.microsoft.com/office/drawing/2014/main" id="{6863329A-15BD-432E-AF09-61FC87500C2F}"/>
+              </a:ext>
+            </a:extLst>
+          </p:cNvPr>
+          <p:cNvSpPr/>
+          <p:nvPr/>
+        </p:nvSpPr>
+        <p:spPr>
+          <a:xfrm>
+            <a:off x="843149" y="777834"/>
+            <a:ext cx="973776" cy="243444"/>
+          </a:xfrm>
+          <a:prstGeom prst="roundRect">
+            <a:avLst/>
+          </a:prstGeom>
+        </p:spPr>
+        <p:style>
+          <a:lnRef idx="2">
+            <a:schemeClr val="accent1">
+              <a:shade val="50000"/>
+            </a:schemeClr>
+          </a:lnRef>
+          <a:fillRef idx="1">
+            <a:schemeClr val="accent1"/>
+          </a:fillRef>
+          <a:effectRef idx="0">
+            <a:schemeClr val="accent1"/>
+          </a:effectRef>
+          <a:fontRef idx="minor">
+            <a:schemeClr val="lt1"/>
+          </a:fontRef>
+        </p:style>
+        <p:txBody>
+          <a:bodyPr rtlCol="0" anchor="ctr"/>
+          <a:lstStyle/>
+          <a:p>
+            <a:pPr marL="0" marR="0" lvl="0" indent="0" algn="ctr" defTabSz="914400" rtl="0" eaLnBrk="1" fontAlgn="auto" latinLnBrk="0" hangingPunct="1">
+              <a:lnSpc>
+                <a:spcPct val="100000"/>
+              </a:lnSpc>
+              <a:spcBef>
+                <a:spcPts val="0"/>
+              </a:spcBef>
+              <a:spcAft>
+                <a:spcPts val="0"/>
+              </a:spcAft>
+              <a:buClrTx/>
+              <a:buSzTx/>
+              <a:buFontTx/>
+              <a:buNone/>
+              <a:tabLst/>
+              <a:defRPr/>
+            </a:pPr>
+            <a:endParaRPr kumimoji="0" lang="en-US" sz="1800" b="0" i="0" u="none" strike="noStrike" kern="1200" cap="none" spc="0" normalizeH="0" baseline="0" noProof="0">
+              <a:ln>
+                <a:noFill/>
+              </a:ln>
+              <a:solidFill>
+                <a:prstClr val="white"/>
+              </a:solidFill>
+              <a:effectLst/>
+              <a:uLnTx/>
+              <a:uFillTx/>
+              <a:latin typeface="Calibri" panose="020F0502020204030204"/>
+              <a:ea typeface="+mn-ea"/>
+              <a:cs typeface="+mn-cs"/>
+            </a:endParaRPr>
+          </a:p>
+        </p:txBody>
+      </p:sp>
+      <p:cxnSp>
+        <p:nvCxnSpPr>
+          <p:cNvPr id="7" name="Straight Connector 6">
+            <a:extLst>
+              <a:ext uri="{FF2B5EF4-FFF2-40B4-BE49-F238E27FC236}">
+                <a16:creationId xmlns:a16="http://schemas.microsoft.com/office/drawing/2014/main" id="{601230DC-ADA6-4686-981B-8BCAA335CD44}"/>
+              </a:ext>
+            </a:extLst>
+          </p:cNvPr>
+          <p:cNvCxnSpPr/>
+          <p:nvPr/>
+        </p:nvCxnSpPr>
+        <p:spPr>
+          <a:xfrm>
+            <a:off x="112816" y="546265"/>
+            <a:ext cx="11732820" cy="0"/>
+          </a:xfrm>
+          <a:prstGeom prst="line">
+            <a:avLst/>
+          </a:prstGeom>
+          <a:ln w="28575"/>
+        </p:spPr>
+        <p:style>
+          <a:lnRef idx="1">
+            <a:schemeClr val="accent1"/>
+          </a:lnRef>
+          <a:fillRef idx="0">
+            <a:schemeClr val="accent1"/>
+          </a:fillRef>
+          <a:effectRef idx="0">
+            <a:schemeClr val="accent1"/>
+          </a:effectRef>
+          <a:fontRef idx="minor">
+            <a:schemeClr val="tx1"/>
+          </a:fontRef>
+        </p:style>
+      </p:cxnSp>
+      <p:sp>
+        <p:nvSpPr>
+          <p:cNvPr id="8" name="Rectangle: Rounded Corners 7">
+            <a:extLst>
+              <a:ext uri="{FF2B5EF4-FFF2-40B4-BE49-F238E27FC236}">
+                <a16:creationId xmlns:a16="http://schemas.microsoft.com/office/drawing/2014/main" id="{A9E43027-8B31-4667-9C6F-118895EBD750}"/>
+              </a:ext>
+            </a:extLst>
+          </p:cNvPr>
+          <p:cNvSpPr/>
+          <p:nvPr/>
+        </p:nvSpPr>
+        <p:spPr>
+          <a:xfrm>
+            <a:off x="3307279" y="95090"/>
+            <a:ext cx="4809506" cy="392322"/>
+          </a:xfrm>
+          <a:prstGeom prst="roundRect">
+            <a:avLst/>
+          </a:prstGeom>
+        </p:spPr>
+        <p:style>
+          <a:lnRef idx="2">
+            <a:schemeClr val="accent1">
+              <a:shade val="50000"/>
+            </a:schemeClr>
+          </a:lnRef>
+          <a:fillRef idx="1">
+            <a:schemeClr val="accent1"/>
+          </a:fillRef>
+          <a:effectRef idx="0">
+            <a:schemeClr val="accent1"/>
+          </a:effectRef>
+          <a:fontRef idx="minor">
+            <a:schemeClr val="lt1"/>
+          </a:fontRef>
+        </p:style>
+        <p:txBody>
+          <a:bodyPr rtlCol="0" anchor="ctr"/>
+          <a:lstStyle/>
+          <a:p>
+            <a:pPr marL="0" marR="0" lvl="0" indent="0" algn="ctr" defTabSz="914400" rtl="0" eaLnBrk="1" fontAlgn="auto" latinLnBrk="0" hangingPunct="1">
+              <a:lnSpc>
+                <a:spcPct val="100000"/>
+              </a:lnSpc>
+              <a:spcBef>
+                <a:spcPts val="0"/>
+              </a:spcBef>
+              <a:spcAft>
+                <a:spcPts val="0"/>
+              </a:spcAft>
+              <a:buClrTx/>
+              <a:buSzTx/>
+              <a:buFontTx/>
+              <a:buNone/>
+              <a:tabLst/>
+              <a:defRPr/>
+            </a:pPr>
+            <a:r>
+              <a:rPr kumimoji="0" lang="en-US" sz="1800" b="0" i="0" u="none" strike="noStrike" kern="1200" cap="none" spc="0" normalizeH="0" baseline="0" noProof="0" dirty="0">
+                <a:ln>
+                  <a:noFill/>
+                </a:ln>
+                <a:solidFill>
+                  <a:prstClr val="white"/>
+                </a:solidFill>
+                <a:effectLst/>
+                <a:uLnTx/>
+                <a:uFillTx/>
+                <a:latin typeface="Calibri" panose="020F0502020204030204"/>
+                <a:ea typeface="+mn-ea"/>
+                <a:cs typeface="+mn-cs"/>
+              </a:rPr>
+              <a:t>Expert Finder – Oregon State Community</a:t>
+            </a:r>
+          </a:p>
+        </p:txBody>
+      </p:sp>
+      <p:cxnSp>
+        <p:nvCxnSpPr>
+          <p:cNvPr id="12" name="Straight Connector 11">
+            <a:extLst>
+              <a:ext uri="{FF2B5EF4-FFF2-40B4-BE49-F238E27FC236}">
+                <a16:creationId xmlns:a16="http://schemas.microsoft.com/office/drawing/2014/main" id="{0E041D00-0CC8-4E12-A616-C800E4069F76}"/>
+              </a:ext>
+            </a:extLst>
+          </p:cNvPr>
+          <p:cNvCxnSpPr/>
+          <p:nvPr/>
+        </p:nvCxnSpPr>
+        <p:spPr>
+          <a:xfrm>
+            <a:off x="182090" y="6430613"/>
+            <a:ext cx="11732820" cy="0"/>
+          </a:xfrm>
+          <a:prstGeom prst="line">
+            <a:avLst/>
+          </a:prstGeom>
+          <a:ln w="28575"/>
+        </p:spPr>
+        <p:style>
+          <a:lnRef idx="1">
+            <a:schemeClr val="accent1"/>
+          </a:lnRef>
+          <a:fillRef idx="0">
+            <a:schemeClr val="accent1"/>
+          </a:fillRef>
+          <a:effectRef idx="0">
+            <a:schemeClr val="accent1"/>
+          </a:effectRef>
+          <a:fontRef idx="minor">
+            <a:schemeClr val="tx1"/>
+          </a:fontRef>
+        </p:style>
+      </p:cxnSp>
+      <p:sp>
+        <p:nvSpPr>
+          <p:cNvPr id="14" name="Rectangle: Rounded Corners 13">
+            <a:extLst>
+              <a:ext uri="{FF2B5EF4-FFF2-40B4-BE49-F238E27FC236}">
+                <a16:creationId xmlns:a16="http://schemas.microsoft.com/office/drawing/2014/main" id="{EC05F3D9-7E53-49EA-8D9F-0A4F2CE3EF64}"/>
+              </a:ext>
+            </a:extLst>
+          </p:cNvPr>
+          <p:cNvSpPr/>
+          <p:nvPr/>
+        </p:nvSpPr>
+        <p:spPr>
+          <a:xfrm>
+            <a:off x="3888020" y="6496665"/>
+            <a:ext cx="3648024" cy="266245"/>
+          </a:xfrm>
+          <a:prstGeom prst="roundRect">
+            <a:avLst/>
+          </a:prstGeom>
+        </p:spPr>
+        <p:style>
+          <a:lnRef idx="2">
+            <a:schemeClr val="accent1">
+              <a:shade val="50000"/>
+            </a:schemeClr>
+          </a:lnRef>
+          <a:fillRef idx="1">
+            <a:schemeClr val="accent1"/>
+          </a:fillRef>
+          <a:effectRef idx="0">
+            <a:schemeClr val="accent1"/>
+          </a:effectRef>
+          <a:fontRef idx="minor">
+            <a:schemeClr val="lt1"/>
+          </a:fontRef>
+        </p:style>
+        <p:txBody>
+          <a:bodyPr rtlCol="0" anchor="ctr"/>
+          <a:lstStyle/>
+          <a:p>
+            <a:pPr marL="0" marR="0" lvl="0" indent="0" algn="ctr" defTabSz="914400" rtl="0" eaLnBrk="1" fontAlgn="auto" latinLnBrk="0" hangingPunct="1">
+              <a:lnSpc>
+                <a:spcPct val="100000"/>
+              </a:lnSpc>
+              <a:spcBef>
+                <a:spcPts val="0"/>
+              </a:spcBef>
+              <a:spcAft>
+                <a:spcPts val="0"/>
+              </a:spcAft>
+              <a:buClrTx/>
+              <a:buSzTx/>
+              <a:buFontTx/>
+              <a:buNone/>
+              <a:tabLst/>
+              <a:defRPr/>
+            </a:pPr>
+            <a:r>
+              <a:rPr kumimoji="0" lang="en-US" sz="1400" b="0" i="0" u="none" strike="noStrike" kern="1200" cap="none" spc="0" normalizeH="0" baseline="0" noProof="0" dirty="0">
+                <a:ln>
+                  <a:noFill/>
+                </a:ln>
+                <a:solidFill>
+                  <a:prstClr val="white"/>
+                </a:solidFill>
+                <a:effectLst/>
+                <a:uLnTx/>
+                <a:uFillTx/>
+                <a:latin typeface="Calibri" panose="020F0502020204030204"/>
+                <a:ea typeface="+mn-ea"/>
+                <a:cs typeface="+mn-cs"/>
+              </a:rPr>
+              <a:t>About – Sitemap – Contact Us – Legal Release</a:t>
+            </a:r>
+          </a:p>
+        </p:txBody>
+      </p:sp>
+      <p:sp>
+        <p:nvSpPr>
+          <p:cNvPr id="2" name="TextBox 1">
+            <a:extLst>
+              <a:ext uri="{FF2B5EF4-FFF2-40B4-BE49-F238E27FC236}">
+                <a16:creationId xmlns:a16="http://schemas.microsoft.com/office/drawing/2014/main" id="{FBA35F9D-AB7C-4209-ADB4-08475390AAF9}"/>
+              </a:ext>
+            </a:extLst>
+          </p:cNvPr>
+          <p:cNvSpPr txBox="1"/>
+          <p:nvPr/>
+        </p:nvSpPr>
+        <p:spPr>
+          <a:xfrm>
+            <a:off x="2199824" y="493815"/>
+            <a:ext cx="6445653" cy="707886"/>
+          </a:xfrm>
+          <a:prstGeom prst="rect">
+            <a:avLst/>
+          </a:prstGeom>
+          <a:noFill/>
+        </p:spPr>
+        <p:txBody>
+          <a:bodyPr wrap="square" rtlCol="0">
+            <a:spAutoFit/>
+          </a:bodyPr>
+          <a:lstStyle/>
+          <a:p>
+            <a:pPr marL="0" marR="0" lvl="0" indent="0" algn="l" defTabSz="914400" rtl="0" eaLnBrk="1" fontAlgn="auto" latinLnBrk="0" hangingPunct="1">
+              <a:lnSpc>
+                <a:spcPct val="100000"/>
+              </a:lnSpc>
+              <a:spcBef>
+                <a:spcPts val="0"/>
+              </a:spcBef>
+              <a:spcAft>
+                <a:spcPts val="0"/>
+              </a:spcAft>
+              <a:buClrTx/>
+              <a:buSzTx/>
+              <a:buFontTx/>
+              <a:buNone/>
+              <a:tabLst/>
+              <a:defRPr/>
+            </a:pPr>
+            <a:r>
+              <a:rPr kumimoji="0" lang="en-US" sz="4000" b="0" i="0" u="none" strike="noStrike" kern="1200" cap="none" spc="0" normalizeH="0" baseline="0" noProof="0" dirty="0">
+                <a:ln>
+                  <a:noFill/>
+                </a:ln>
+                <a:solidFill>
+                  <a:srgbClr val="4472C4">
+                    <a:lumMod val="75000"/>
+                  </a:srgbClr>
+                </a:solidFill>
+                <a:effectLst/>
+                <a:uLnTx/>
+                <a:uFillTx/>
+                <a:latin typeface="Calibri" panose="020F0502020204030204"/>
+                <a:ea typeface="+mn-ea"/>
+                <a:cs typeface="+mn-cs"/>
+              </a:rPr>
+              <a:t>GitHub Links for John Doe:</a:t>
+            </a:r>
+          </a:p>
+        </p:txBody>
+      </p:sp>
+      <p:sp>
+        <p:nvSpPr>
+          <p:cNvPr id="15" name="TextBox 14">
+            <a:extLst>
+              <a:ext uri="{FF2B5EF4-FFF2-40B4-BE49-F238E27FC236}">
+                <a16:creationId xmlns:a16="http://schemas.microsoft.com/office/drawing/2014/main" id="{A566F99D-4030-4568-AFE9-A5F1975C5FE6}"/>
+              </a:ext>
+            </a:extLst>
+          </p:cNvPr>
+          <p:cNvSpPr txBox="1"/>
+          <p:nvPr/>
+        </p:nvSpPr>
+        <p:spPr>
+          <a:xfrm>
+            <a:off x="348732" y="126213"/>
+            <a:ext cx="1215397" cy="276999"/>
+          </a:xfrm>
+          <a:prstGeom prst="rect">
+            <a:avLst/>
+          </a:prstGeom>
+          <a:solidFill>
+            <a:srgbClr val="00B0F0"/>
+          </a:solidFill>
+          <a:effectLst>
+            <a:glow rad="101600">
+              <a:schemeClr val="accent1">
+                <a:satMod val="175000"/>
+                <a:alpha val="40000"/>
+              </a:schemeClr>
+            </a:glow>
+          </a:effectLst>
+        </p:spPr>
+        <p:txBody>
+          <a:bodyPr wrap="none" rtlCol="0">
+            <a:spAutoFit/>
+          </a:bodyPr>
+          <a:lstStyle/>
+          <a:p>
+            <a:pPr marL="0" marR="0" lvl="0" indent="0" algn="l" defTabSz="914400" rtl="0" eaLnBrk="1" fontAlgn="auto" latinLnBrk="0" hangingPunct="1">
+              <a:lnSpc>
+                <a:spcPct val="100000"/>
+              </a:lnSpc>
+              <a:spcBef>
+                <a:spcPts val="0"/>
+              </a:spcBef>
+              <a:spcAft>
+                <a:spcPts val="0"/>
+              </a:spcAft>
+              <a:buClrTx/>
+              <a:buSzTx/>
+              <a:buFontTx/>
+              <a:buNone/>
+              <a:tabLst/>
+              <a:defRPr/>
+            </a:pPr>
+            <a:r>
+              <a:rPr kumimoji="0" lang="en-US" sz="1200" b="0" i="0" u="none" strike="noStrike" kern="1200" cap="none" spc="0" normalizeH="0" baseline="0" noProof="0" dirty="0">
+                <a:ln>
+                  <a:noFill/>
+                </a:ln>
+                <a:solidFill>
+                  <a:prstClr val="black"/>
+                </a:solidFill>
+                <a:effectLst/>
+                <a:uLnTx/>
+                <a:uFillTx/>
+                <a:latin typeface="Calibri" panose="020F0502020204030204"/>
+                <a:ea typeface="+mn-ea"/>
+                <a:cs typeface="+mn-cs"/>
+              </a:rPr>
+              <a:t>Log In or Sign up</a:t>
+            </a:r>
+          </a:p>
+        </p:txBody>
+      </p:sp>
+      <p:sp>
+        <p:nvSpPr>
+          <p:cNvPr id="32" name="TextBox 31">
+            <a:extLst>
+              <a:ext uri="{FF2B5EF4-FFF2-40B4-BE49-F238E27FC236}">
+                <a16:creationId xmlns:a16="http://schemas.microsoft.com/office/drawing/2014/main" id="{54990096-EC1F-4467-9E2D-AD5C329C20F1}"/>
+              </a:ext>
+            </a:extLst>
+          </p:cNvPr>
+          <p:cNvSpPr txBox="1"/>
+          <p:nvPr/>
+        </p:nvSpPr>
+        <p:spPr>
+          <a:xfrm>
+            <a:off x="921321" y="2226956"/>
+            <a:ext cx="842607" cy="276999"/>
+          </a:xfrm>
+          <a:prstGeom prst="rect">
+            <a:avLst/>
+          </a:prstGeom>
+          <a:noFill/>
+          <a:ln>
+            <a:solidFill>
+              <a:schemeClr val="tx1"/>
+            </a:solidFill>
+          </a:ln>
+        </p:spPr>
+        <p:txBody>
+          <a:bodyPr wrap="square" rtlCol="0">
+            <a:spAutoFit/>
+          </a:bodyPr>
+          <a:lstStyle/>
+          <a:p>
+            <a:pPr marL="0" marR="0" lvl="0" indent="0" algn="l" defTabSz="914400" rtl="0" eaLnBrk="1" fontAlgn="auto" latinLnBrk="0" hangingPunct="1">
+              <a:lnSpc>
+                <a:spcPct val="100000"/>
+              </a:lnSpc>
+              <a:spcBef>
+                <a:spcPts val="0"/>
+              </a:spcBef>
+              <a:spcAft>
+                <a:spcPts val="0"/>
+              </a:spcAft>
+              <a:buClrTx/>
+              <a:buSzTx/>
+              <a:buFontTx/>
+              <a:buNone/>
+              <a:tabLst/>
+              <a:defRPr/>
+            </a:pPr>
+            <a:r>
+              <a:rPr kumimoji="0" lang="en-US" sz="1200" b="0" i="0" u="none" strike="noStrike" kern="1200" cap="none" spc="0" normalizeH="0" baseline="0" noProof="0" dirty="0">
+                <a:ln>
+                  <a:noFill/>
+                </a:ln>
+                <a:solidFill>
+                  <a:prstClr val="black"/>
+                </a:solidFill>
+                <a:effectLst/>
+                <a:uLnTx/>
+                <a:uFillTx/>
+                <a:latin typeface="Calibri" panose="020F0502020204030204"/>
+                <a:ea typeface="+mn-ea"/>
+                <a:cs typeface="+mn-cs"/>
+              </a:rPr>
+              <a:t>Side menu</a:t>
+            </a:r>
+          </a:p>
+        </p:txBody>
+      </p:sp>
+      <p:cxnSp>
+        <p:nvCxnSpPr>
+          <p:cNvPr id="34" name="Straight Arrow Connector 33">
+            <a:extLst>
+              <a:ext uri="{FF2B5EF4-FFF2-40B4-BE49-F238E27FC236}">
+                <a16:creationId xmlns:a16="http://schemas.microsoft.com/office/drawing/2014/main" id="{05003E19-4BA6-4855-B01F-A70E3053BBD6}"/>
+              </a:ext>
+            </a:extLst>
+          </p:cNvPr>
+          <p:cNvCxnSpPr>
+            <a:stCxn id="32" idx="0"/>
+          </p:cNvCxnSpPr>
+          <p:nvPr/>
+        </p:nvCxnSpPr>
+        <p:spPr>
+          <a:xfrm flipH="1" flipV="1">
+            <a:off x="530373" y="1696002"/>
+            <a:ext cx="812252" cy="530954"/>
+          </a:xfrm>
+          <a:prstGeom prst="straightConnector1">
+            <a:avLst/>
+          </a:prstGeom>
+          <a:ln>
+            <a:solidFill>
+              <a:schemeClr val="tx1"/>
+            </a:solidFill>
+            <a:tailEnd type="triangle"/>
+          </a:ln>
+        </p:spPr>
+        <p:style>
+          <a:lnRef idx="1">
+            <a:schemeClr val="accent1"/>
+          </a:lnRef>
+          <a:fillRef idx="0">
+            <a:schemeClr val="accent1"/>
+          </a:fillRef>
+          <a:effectRef idx="0">
+            <a:schemeClr val="accent1"/>
+          </a:effectRef>
+          <a:fontRef idx="minor">
+            <a:schemeClr val="tx1"/>
+          </a:fontRef>
+        </p:style>
+      </p:cxnSp>
+      <p:cxnSp>
+        <p:nvCxnSpPr>
+          <p:cNvPr id="23" name="Straight Connector 22">
+            <a:extLst>
+              <a:ext uri="{FF2B5EF4-FFF2-40B4-BE49-F238E27FC236}">
+                <a16:creationId xmlns:a16="http://schemas.microsoft.com/office/drawing/2014/main" id="{6F1E786E-431A-4A68-9F00-E033F650D081}"/>
+              </a:ext>
+            </a:extLst>
+          </p:cNvPr>
+          <p:cNvCxnSpPr>
+            <a:cxnSpLocks/>
+          </p:cNvCxnSpPr>
+          <p:nvPr/>
+        </p:nvCxnSpPr>
+        <p:spPr>
+          <a:xfrm>
+            <a:off x="2274957" y="1351722"/>
+            <a:ext cx="9753599" cy="0"/>
+          </a:xfrm>
+          <a:prstGeom prst="line">
+            <a:avLst/>
+          </a:prstGeom>
+          <a:ln w="57150"/>
+          <a:effectLst>
+            <a:glow rad="63500">
+              <a:schemeClr val="accent1">
+                <a:satMod val="175000"/>
+                <a:alpha val="40000"/>
+              </a:schemeClr>
+            </a:glow>
+          </a:effectLst>
+        </p:spPr>
+        <p:style>
+          <a:lnRef idx="1">
+            <a:schemeClr val="accent1"/>
+          </a:lnRef>
+          <a:fillRef idx="0">
+            <a:schemeClr val="accent1"/>
+          </a:fillRef>
+          <a:effectRef idx="0">
+            <a:schemeClr val="accent1"/>
+          </a:effectRef>
+          <a:fontRef idx="minor">
+            <a:schemeClr val="tx1"/>
+          </a:fontRef>
+        </p:style>
+      </p:cxnSp>
+      <p:cxnSp>
+        <p:nvCxnSpPr>
+          <p:cNvPr id="25" name="Straight Connector 24">
+            <a:extLst>
+              <a:ext uri="{FF2B5EF4-FFF2-40B4-BE49-F238E27FC236}">
+                <a16:creationId xmlns:a16="http://schemas.microsoft.com/office/drawing/2014/main" id="{B6246EDE-53BC-42CC-A31C-5BDADA6B6009}"/>
+              </a:ext>
+            </a:extLst>
+          </p:cNvPr>
+          <p:cNvCxnSpPr>
+            <a:cxnSpLocks/>
+          </p:cNvCxnSpPr>
+          <p:nvPr/>
+        </p:nvCxnSpPr>
+        <p:spPr>
+          <a:xfrm>
+            <a:off x="2154876" y="777834"/>
+            <a:ext cx="89159" cy="5587627"/>
+          </a:xfrm>
+          <a:prstGeom prst="line">
+            <a:avLst/>
+          </a:prstGeom>
+          <a:ln w="57150"/>
+          <a:effectLst>
+            <a:glow rad="63500">
+              <a:schemeClr val="accent1">
+                <a:satMod val="175000"/>
+                <a:alpha val="40000"/>
+              </a:schemeClr>
+            </a:glow>
+          </a:effectLst>
+        </p:spPr>
+        <p:style>
+          <a:lnRef idx="1">
+            <a:schemeClr val="accent1"/>
+          </a:lnRef>
+          <a:fillRef idx="0">
+            <a:schemeClr val="accent1"/>
+          </a:fillRef>
+          <a:effectRef idx="0">
+            <a:schemeClr val="accent1"/>
+          </a:effectRef>
+          <a:fontRef idx="minor">
+            <a:schemeClr val="tx1"/>
+          </a:fontRef>
+        </p:style>
+      </p:cxnSp>
+      <p:sp>
+        <p:nvSpPr>
+          <p:cNvPr id="41" name="TextBox 40">
+            <a:extLst>
+              <a:ext uri="{FF2B5EF4-FFF2-40B4-BE49-F238E27FC236}">
+                <a16:creationId xmlns:a16="http://schemas.microsoft.com/office/drawing/2014/main" id="{B9313189-F5B5-4542-A637-4D014DB20CBB}"/>
+              </a:ext>
+            </a:extLst>
+          </p:cNvPr>
+          <p:cNvSpPr txBox="1"/>
+          <p:nvPr/>
+        </p:nvSpPr>
+        <p:spPr>
+          <a:xfrm>
+            <a:off x="3525079" y="5576572"/>
+            <a:ext cx="6805776" cy="369332"/>
+          </a:xfrm>
+          <a:prstGeom prst="rect">
+            <a:avLst/>
+          </a:prstGeom>
+          <a:noFill/>
+        </p:spPr>
+        <p:txBody>
+          <a:bodyPr wrap="square">
+            <a:spAutoFit/>
+          </a:bodyPr>
+          <a:lstStyle/>
+          <a:p>
+            <a:pPr marL="0" marR="0" lvl="0" indent="0" algn="l" defTabSz="914400" rtl="0" eaLnBrk="1" fontAlgn="auto" latinLnBrk="0" hangingPunct="1">
+              <a:lnSpc>
+                <a:spcPct val="100000"/>
+              </a:lnSpc>
+              <a:spcBef>
+                <a:spcPts val="0"/>
+              </a:spcBef>
+              <a:spcAft>
+                <a:spcPts val="0"/>
+              </a:spcAft>
+              <a:buClrTx/>
+              <a:buSzTx/>
+              <a:buFontTx/>
+              <a:buNone/>
+              <a:tabLst/>
+              <a:defRPr/>
+            </a:pPr>
+            <a:r>
+              <a:rPr kumimoji="0" lang="en-US" sz="1800" b="0" i="1" u="none" strike="noStrike" kern="1200" cap="none" spc="0" normalizeH="0" baseline="0" noProof="0" dirty="0">
+                <a:ln>
+                  <a:noFill/>
+                </a:ln>
+                <a:solidFill>
+                  <a:srgbClr val="4472C4">
+                    <a:lumMod val="75000"/>
+                  </a:srgbClr>
+                </a:solidFill>
+                <a:effectLst/>
+                <a:uLnTx/>
+                <a:uFillTx/>
+                <a:latin typeface="Calibri" panose="020F0502020204030204"/>
+                <a:ea typeface="+mn-ea"/>
+                <a:cs typeface="+mn-cs"/>
+              </a:rPr>
+              <a:t>Back to the User’s Profile:  </a:t>
+            </a:r>
+            <a:r>
+              <a:rPr kumimoji="0" lang="en-US" sz="1800" b="1" i="1" u="sng" strike="noStrike" kern="1200" cap="none" spc="0" normalizeH="0" baseline="0" noProof="0" dirty="0">
+                <a:ln>
+                  <a:noFill/>
+                </a:ln>
+                <a:solidFill>
+                  <a:srgbClr val="4472C4">
+                    <a:lumMod val="75000"/>
+                  </a:srgbClr>
+                </a:solidFill>
+                <a:effectLst/>
+                <a:uLnTx/>
+                <a:uFillTx/>
+                <a:latin typeface="Calibri" panose="020F0502020204030204"/>
+                <a:ea typeface="+mn-ea"/>
+                <a:cs typeface="+mn-cs"/>
+              </a:rPr>
+              <a:t>John Doe</a:t>
+            </a:r>
+          </a:p>
+        </p:txBody>
+      </p:sp>
+      <p:sp>
+        <p:nvSpPr>
+          <p:cNvPr id="44" name="TextBox 43">
+            <a:extLst>
+              <a:ext uri="{FF2B5EF4-FFF2-40B4-BE49-F238E27FC236}">
+                <a16:creationId xmlns:a16="http://schemas.microsoft.com/office/drawing/2014/main" id="{E5F52AF2-FFCB-4A67-89B3-3FBC955BA3D2}"/>
+              </a:ext>
+            </a:extLst>
+          </p:cNvPr>
+          <p:cNvSpPr txBox="1"/>
+          <p:nvPr/>
+        </p:nvSpPr>
+        <p:spPr>
+          <a:xfrm>
+            <a:off x="4246733" y="4375742"/>
+            <a:ext cx="1708774" cy="830997"/>
+          </a:xfrm>
+          <a:prstGeom prst="rect">
+            <a:avLst/>
+          </a:prstGeom>
+          <a:noFill/>
+          <a:ln>
+            <a:solidFill>
+              <a:schemeClr val="tx1"/>
+            </a:solidFill>
+          </a:ln>
+        </p:spPr>
+        <p:txBody>
+          <a:bodyPr wrap="square" rtlCol="0">
+            <a:spAutoFit/>
+          </a:bodyPr>
+          <a:lstStyle/>
+          <a:p>
+            <a:pPr marL="0" marR="0" lvl="0" indent="0" algn="l" defTabSz="914400" rtl="0" eaLnBrk="1" fontAlgn="auto" latinLnBrk="0" hangingPunct="1">
+              <a:lnSpc>
+                <a:spcPct val="100000"/>
+              </a:lnSpc>
+              <a:spcBef>
+                <a:spcPts val="0"/>
+              </a:spcBef>
+              <a:spcAft>
+                <a:spcPts val="0"/>
+              </a:spcAft>
+              <a:buClrTx/>
+              <a:buSzTx/>
+              <a:buFontTx/>
+              <a:buNone/>
+              <a:tabLst/>
+              <a:defRPr/>
+            </a:pPr>
+            <a:r>
+              <a:rPr kumimoji="0" lang="en-US" sz="1200" b="0" i="0" u="none" strike="noStrike" kern="1200" cap="none" spc="0" normalizeH="0" baseline="0" noProof="0" dirty="0">
+                <a:ln>
+                  <a:noFill/>
+                </a:ln>
+                <a:solidFill>
+                  <a:prstClr val="black"/>
+                </a:solidFill>
+                <a:effectLst/>
+                <a:uLnTx/>
+                <a:uFillTx/>
+                <a:latin typeface="Calibri" panose="020F0502020204030204"/>
+                <a:ea typeface="+mn-ea"/>
+                <a:cs typeface="+mn-cs"/>
+              </a:rPr>
+              <a:t>Hyperlinks to take the user back to the profile</a:t>
+            </a:r>
+            <a:r>
+              <a:rPr lang="en-US" sz="1200" dirty="0">
+                <a:solidFill>
+                  <a:prstClr val="black"/>
+                </a:solidFill>
+                <a:latin typeface="Calibri" panose="020F0502020204030204"/>
+              </a:rPr>
+              <a:t>e page from which they came from.</a:t>
+            </a:r>
+            <a:endParaRPr kumimoji="0" lang="en-US" sz="1200" b="0" i="0" u="none" strike="noStrike" kern="1200" cap="none" spc="0" normalizeH="0" baseline="0" noProof="0" dirty="0">
+              <a:ln>
+                <a:noFill/>
+              </a:ln>
+              <a:solidFill>
+                <a:prstClr val="black"/>
+              </a:solidFill>
+              <a:effectLst/>
+              <a:uLnTx/>
+              <a:uFillTx/>
+              <a:latin typeface="Calibri" panose="020F0502020204030204"/>
+              <a:ea typeface="+mn-ea"/>
+              <a:cs typeface="+mn-cs"/>
+            </a:endParaRPr>
+          </a:p>
+        </p:txBody>
+      </p:sp>
+      <p:cxnSp>
+        <p:nvCxnSpPr>
+          <p:cNvPr id="45" name="Straight Arrow Connector 44">
+            <a:extLst>
+              <a:ext uri="{FF2B5EF4-FFF2-40B4-BE49-F238E27FC236}">
+                <a16:creationId xmlns:a16="http://schemas.microsoft.com/office/drawing/2014/main" id="{7D682B7D-3F1A-44A4-8412-71802E80657F}"/>
+              </a:ext>
+            </a:extLst>
+          </p:cNvPr>
+          <p:cNvCxnSpPr>
+            <a:cxnSpLocks/>
+            <a:stCxn id="44" idx="3"/>
+          </p:cNvCxnSpPr>
+          <p:nvPr/>
+        </p:nvCxnSpPr>
+        <p:spPr>
+          <a:xfrm>
+            <a:off x="5955507" y="4791241"/>
+            <a:ext cx="242955" cy="703615"/>
+          </a:xfrm>
+          <a:prstGeom prst="straightConnector1">
+            <a:avLst/>
+          </a:prstGeom>
+          <a:ln>
+            <a:solidFill>
+              <a:schemeClr val="tx1"/>
+            </a:solidFill>
+            <a:tailEnd type="triangle"/>
+          </a:ln>
+        </p:spPr>
+        <p:style>
+          <a:lnRef idx="1">
+            <a:schemeClr val="accent1"/>
+          </a:lnRef>
+          <a:fillRef idx="0">
+            <a:schemeClr val="accent1"/>
+          </a:fillRef>
+          <a:effectRef idx="0">
+            <a:schemeClr val="accent1"/>
+          </a:effectRef>
+          <a:fontRef idx="minor">
+            <a:schemeClr val="tx1"/>
+          </a:fontRef>
+        </p:style>
+      </p:cxnSp>
+      <p:sp>
+        <p:nvSpPr>
+          <p:cNvPr id="3" name="TextBox 2">
+            <a:extLst>
+              <a:ext uri="{FF2B5EF4-FFF2-40B4-BE49-F238E27FC236}">
+                <a16:creationId xmlns:a16="http://schemas.microsoft.com/office/drawing/2014/main" id="{B0737E6F-DAEA-4A2F-96C7-74EB695BA94B}"/>
+              </a:ext>
+            </a:extLst>
+          </p:cNvPr>
+          <p:cNvSpPr txBox="1"/>
+          <p:nvPr/>
+        </p:nvSpPr>
+        <p:spPr>
+          <a:xfrm>
+            <a:off x="2857342" y="1577712"/>
+            <a:ext cx="2445285" cy="369332"/>
+          </a:xfrm>
+          <a:prstGeom prst="rect">
+            <a:avLst/>
+          </a:prstGeom>
+          <a:noFill/>
+        </p:spPr>
+        <p:txBody>
+          <a:bodyPr wrap="none" rtlCol="0">
+            <a:spAutoFit/>
+          </a:bodyPr>
+          <a:lstStyle/>
+          <a:p>
+            <a:pPr marL="0" marR="0" lvl="0" indent="0" algn="l" defTabSz="914400" rtl="0" eaLnBrk="1" fontAlgn="auto" latinLnBrk="0" hangingPunct="1">
+              <a:lnSpc>
+                <a:spcPct val="100000"/>
+              </a:lnSpc>
+              <a:spcBef>
+                <a:spcPts val="0"/>
+              </a:spcBef>
+              <a:spcAft>
+                <a:spcPts val="0"/>
+              </a:spcAft>
+              <a:buClrTx/>
+              <a:buSzTx/>
+              <a:buFontTx/>
+              <a:buNone/>
+              <a:tabLst/>
+              <a:defRPr/>
+            </a:pPr>
+            <a:r>
+              <a:rPr kumimoji="0" lang="en-US" sz="1800" b="1" i="0" u="none" strike="noStrike" kern="1200" cap="none" spc="0" normalizeH="0" baseline="0" noProof="0" dirty="0" err="1">
+                <a:ln>
+                  <a:noFill/>
+                </a:ln>
+                <a:solidFill>
+                  <a:srgbClr val="4472C4">
+                    <a:lumMod val="75000"/>
+                  </a:srgbClr>
+                </a:solidFill>
+                <a:effectLst/>
+                <a:uLnTx/>
+                <a:uFillTx/>
+                <a:latin typeface="Calibri" panose="020F0502020204030204"/>
+                <a:ea typeface="+mn-ea"/>
+                <a:cs typeface="+mn-cs"/>
+              </a:rPr>
+              <a:t>JohnDoe</a:t>
+            </a:r>
+            <a:r>
+              <a:rPr kumimoji="0" lang="en-US" sz="1800" b="1" i="0" u="none" strike="noStrike" kern="1200" cap="none" spc="0" normalizeH="0" baseline="0" noProof="0" dirty="0">
+                <a:ln>
+                  <a:noFill/>
+                </a:ln>
+                <a:solidFill>
+                  <a:srgbClr val="4472C4">
+                    <a:lumMod val="75000"/>
+                  </a:srgbClr>
+                </a:solidFill>
+                <a:effectLst/>
+                <a:uLnTx/>
+                <a:uFillTx/>
+                <a:latin typeface="Calibri" panose="020F0502020204030204"/>
+                <a:ea typeface="+mn-ea"/>
+                <a:cs typeface="+mn-cs"/>
+              </a:rPr>
+              <a:t>/CS361-Project</a:t>
+            </a:r>
+          </a:p>
+        </p:txBody>
+      </p:sp>
+      <p:sp>
+        <p:nvSpPr>
+          <p:cNvPr id="9" name="TextBox 8">
+            <a:extLst>
+              <a:ext uri="{FF2B5EF4-FFF2-40B4-BE49-F238E27FC236}">
+                <a16:creationId xmlns:a16="http://schemas.microsoft.com/office/drawing/2014/main" id="{8F9AF612-D9BD-4631-A224-331FAC012137}"/>
+              </a:ext>
+            </a:extLst>
+          </p:cNvPr>
+          <p:cNvSpPr txBox="1"/>
+          <p:nvPr/>
+        </p:nvSpPr>
+        <p:spPr>
+          <a:xfrm>
+            <a:off x="2866887" y="2270710"/>
+            <a:ext cx="2445285" cy="369332"/>
+          </a:xfrm>
+          <a:prstGeom prst="rect">
+            <a:avLst/>
+          </a:prstGeom>
+          <a:noFill/>
+        </p:spPr>
+        <p:txBody>
+          <a:bodyPr wrap="none" rtlCol="0">
+            <a:spAutoFit/>
+          </a:bodyPr>
+          <a:lstStyle/>
+          <a:p>
+            <a:pPr marL="0" marR="0" lvl="0" indent="0" algn="l" defTabSz="914400" rtl="0" eaLnBrk="1" fontAlgn="auto" latinLnBrk="0" hangingPunct="1">
+              <a:lnSpc>
+                <a:spcPct val="100000"/>
+              </a:lnSpc>
+              <a:spcBef>
+                <a:spcPts val="0"/>
+              </a:spcBef>
+              <a:spcAft>
+                <a:spcPts val="0"/>
+              </a:spcAft>
+              <a:buClrTx/>
+              <a:buSzTx/>
+              <a:buFontTx/>
+              <a:buNone/>
+              <a:tabLst/>
+              <a:defRPr/>
+            </a:pPr>
+            <a:r>
+              <a:rPr kumimoji="0" lang="en-US" sz="1800" b="1" i="0" u="none" strike="noStrike" kern="1200" cap="none" spc="0" normalizeH="0" baseline="0" noProof="0" dirty="0" err="1">
+                <a:ln>
+                  <a:noFill/>
+                </a:ln>
+                <a:solidFill>
+                  <a:srgbClr val="4472C4">
+                    <a:lumMod val="75000"/>
+                  </a:srgbClr>
+                </a:solidFill>
+                <a:effectLst/>
+                <a:uLnTx/>
+                <a:uFillTx/>
+                <a:latin typeface="Calibri" panose="020F0502020204030204"/>
+                <a:ea typeface="+mn-ea"/>
+                <a:cs typeface="+mn-cs"/>
+              </a:rPr>
+              <a:t>JohnDoe</a:t>
+            </a:r>
+            <a:r>
+              <a:rPr kumimoji="0" lang="en-US" sz="1800" b="1" i="0" u="none" strike="noStrike" kern="1200" cap="none" spc="0" normalizeH="0" baseline="0" noProof="0" dirty="0">
+                <a:ln>
+                  <a:noFill/>
+                </a:ln>
+                <a:solidFill>
+                  <a:srgbClr val="4472C4">
+                    <a:lumMod val="75000"/>
+                  </a:srgbClr>
+                </a:solidFill>
+                <a:effectLst/>
+                <a:uLnTx/>
+                <a:uFillTx/>
+                <a:latin typeface="Calibri" panose="020F0502020204030204"/>
+                <a:ea typeface="+mn-ea"/>
+                <a:cs typeface="+mn-cs"/>
+              </a:rPr>
+              <a:t>/CS290-Project</a:t>
+            </a:r>
+          </a:p>
+        </p:txBody>
+      </p:sp>
+      <p:sp>
+        <p:nvSpPr>
+          <p:cNvPr id="57" name="TextBox 56">
+            <a:extLst>
+              <a:ext uri="{FF2B5EF4-FFF2-40B4-BE49-F238E27FC236}">
+                <a16:creationId xmlns:a16="http://schemas.microsoft.com/office/drawing/2014/main" id="{755BA3F8-27DE-48A6-8403-C208BF04DA4A}"/>
+              </a:ext>
+            </a:extLst>
+          </p:cNvPr>
+          <p:cNvSpPr txBox="1"/>
+          <p:nvPr/>
+        </p:nvSpPr>
+        <p:spPr>
+          <a:xfrm>
+            <a:off x="71252" y="3655303"/>
+            <a:ext cx="2017058" cy="1200329"/>
+          </a:xfrm>
+          <a:prstGeom prst="rect">
+            <a:avLst/>
+          </a:prstGeom>
+          <a:noFill/>
+          <a:ln>
+            <a:solidFill>
+              <a:schemeClr val="tx1"/>
+            </a:solidFill>
+          </a:ln>
+        </p:spPr>
+        <p:txBody>
+          <a:bodyPr wrap="square" rtlCol="0">
+            <a:spAutoFit/>
+          </a:bodyPr>
+          <a:lstStyle/>
+          <a:p>
+            <a:pPr marL="0" marR="0" lvl="0" indent="0" algn="l" defTabSz="914400" rtl="0" eaLnBrk="1" fontAlgn="auto" latinLnBrk="0" hangingPunct="1">
+              <a:lnSpc>
+                <a:spcPct val="100000"/>
+              </a:lnSpc>
+              <a:spcBef>
+                <a:spcPts val="0"/>
+              </a:spcBef>
+              <a:spcAft>
+                <a:spcPts val="0"/>
+              </a:spcAft>
+              <a:buClrTx/>
+              <a:buSzTx/>
+              <a:buFontTx/>
+              <a:buNone/>
+              <a:tabLst/>
+              <a:defRPr/>
+            </a:pPr>
+            <a:r>
+              <a:rPr kumimoji="0" lang="en-US" sz="1200" b="0" i="0" u="none" strike="noStrike" kern="1200" cap="none" spc="0" normalizeH="0" baseline="0" noProof="0" dirty="0">
+                <a:ln>
+                  <a:noFill/>
+                </a:ln>
+                <a:solidFill>
+                  <a:prstClr val="black"/>
+                </a:solidFill>
+                <a:effectLst/>
+                <a:uLnTx/>
+                <a:uFillTx/>
+                <a:latin typeface="Calibri" panose="020F0502020204030204"/>
+                <a:ea typeface="+mn-ea"/>
+                <a:cs typeface="+mn-cs"/>
+              </a:rPr>
+              <a:t>Results displayed in order provided by the GitHub API. Moving the mouse over the links provides more information about each of them.</a:t>
+            </a:r>
+          </a:p>
+        </p:txBody>
+      </p:sp>
+      <p:cxnSp>
+        <p:nvCxnSpPr>
+          <p:cNvPr id="59" name="Straight Arrow Connector 58">
+            <a:extLst>
+              <a:ext uri="{FF2B5EF4-FFF2-40B4-BE49-F238E27FC236}">
+                <a16:creationId xmlns:a16="http://schemas.microsoft.com/office/drawing/2014/main" id="{6A3AC703-1A10-42D9-874C-759EF296F552}"/>
+              </a:ext>
+            </a:extLst>
+          </p:cNvPr>
+          <p:cNvCxnSpPr>
+            <a:cxnSpLocks/>
+            <a:stCxn id="57" idx="0"/>
+            <a:endCxn id="3" idx="1"/>
+          </p:cNvCxnSpPr>
+          <p:nvPr/>
+        </p:nvCxnSpPr>
+        <p:spPr>
+          <a:xfrm flipV="1">
+            <a:off x="1079781" y="1762378"/>
+            <a:ext cx="1777561" cy="1892925"/>
+          </a:xfrm>
+          <a:prstGeom prst="straightConnector1">
+            <a:avLst/>
+          </a:prstGeom>
+          <a:ln>
+            <a:solidFill>
+              <a:schemeClr val="tx1"/>
+            </a:solidFill>
+            <a:tailEnd type="triangle"/>
+          </a:ln>
+        </p:spPr>
+        <p:style>
+          <a:lnRef idx="1">
+            <a:schemeClr val="accent1"/>
+          </a:lnRef>
+          <a:fillRef idx="0">
+            <a:schemeClr val="accent1"/>
+          </a:fillRef>
+          <a:effectRef idx="0">
+            <a:schemeClr val="accent1"/>
+          </a:effectRef>
+          <a:fontRef idx="minor">
+            <a:schemeClr val="tx1"/>
+          </a:fontRef>
+        </p:style>
+      </p:cxnSp>
+      <p:cxnSp>
+        <p:nvCxnSpPr>
+          <p:cNvPr id="61" name="Straight Arrow Connector 60">
+            <a:extLst>
+              <a:ext uri="{FF2B5EF4-FFF2-40B4-BE49-F238E27FC236}">
+                <a16:creationId xmlns:a16="http://schemas.microsoft.com/office/drawing/2014/main" id="{68A9DC0D-3153-4B03-BA69-B0BB3320F0ED}"/>
+              </a:ext>
+            </a:extLst>
+          </p:cNvPr>
+          <p:cNvCxnSpPr>
+            <a:cxnSpLocks/>
+            <a:stCxn id="57" idx="0"/>
+          </p:cNvCxnSpPr>
+          <p:nvPr/>
+        </p:nvCxnSpPr>
+        <p:spPr>
+          <a:xfrm flipV="1">
+            <a:off x="1079781" y="2640043"/>
+            <a:ext cx="2681106" cy="1015260"/>
+          </a:xfrm>
+          <a:prstGeom prst="straightConnector1">
+            <a:avLst/>
+          </a:prstGeom>
+          <a:ln>
+            <a:solidFill>
+              <a:schemeClr val="tx1"/>
+            </a:solidFill>
+            <a:tailEnd type="triangle"/>
+          </a:ln>
+        </p:spPr>
+        <p:style>
+          <a:lnRef idx="1">
+            <a:schemeClr val="accent1"/>
+          </a:lnRef>
+          <a:fillRef idx="0">
+            <a:schemeClr val="accent1"/>
+          </a:fillRef>
+          <a:effectRef idx="0">
+            <a:schemeClr val="accent1"/>
+          </a:effectRef>
+          <a:fontRef idx="minor">
+            <a:schemeClr val="tx1"/>
+          </a:fontRef>
+        </p:style>
+      </p:cxnSp>
+    </p:spTree>
+    <p:extLst>
+      <p:ext uri="{BB962C8B-B14F-4D97-AF65-F5344CB8AC3E}">
+        <p14:creationId xmlns:p14="http://schemas.microsoft.com/office/powerpoint/2010/main" val="707858393"/>
+      </p:ext>
+    </p:extLst>
+  </p:cSld>
+  <p:clrMapOvr>
+    <a:masterClrMapping/>
+  </p:clrMapOvr>
+</p:sld>
+</file>
+
 <file path=ppt/theme/theme1.xml><?xml version="1.0" encoding="utf-8"?>
 <a:theme xmlns:a="http://schemas.openxmlformats.org/drawingml/2006/main" name="Office Theme">
   <a:themeElements>

</xml_diff>